<commit_message>
fix mutation counting for figs 1 and 2
</commit_message>
<xml_diff>
--- a/analysis/plots/fig1_supp2.pptx
+++ b/analysis/plots/fig1_supp2.pptx
@@ -107,6 +107,11 @@
       </a:defRPr>
     </a:lvl9pPr>
   </p:defaultTextStyle>
+  <p:extLst>
+    <p:ext uri="{EFAFB233-063F-42B5-8137-9DF3F51BA10A}">
+      <p15:sldGuideLst xmlns:p15="http://schemas.microsoft.com/office/powerpoint/2012/main"/>
+    </p:ext>
+  </p:extLst>
 </p:presentation>
 </file>
 
@@ -192,7 +197,7 @@
           <a:p>
             <a:fld id="{823974A6-29DA-5F4C-9E7A-C6453FF98DB1}" type="datetimeFigureOut">
               <a:rPr lang="en-US" smtClean="0"/>
-              <a:t>8/15/21</a:t>
+              <a:t>8/18/21</a:t>
             </a:fld>
             <a:endParaRPr lang="en-US"/>
           </a:p>
@@ -679,7 +684,7 @@
           <a:p>
             <a:fld id="{3D4FB17C-64C5-814C-8D68-9570E398B727}" type="datetimeFigureOut">
               <a:rPr lang="en-US" smtClean="0"/>
-              <a:t>8/15/21</a:t>
+              <a:t>8/18/21</a:t>
             </a:fld>
             <a:endParaRPr lang="en-US"/>
           </a:p>
@@ -849,7 +854,7 @@
           <a:p>
             <a:fld id="{3D4FB17C-64C5-814C-8D68-9570E398B727}" type="datetimeFigureOut">
               <a:rPr lang="en-US" smtClean="0"/>
-              <a:t>8/15/21</a:t>
+              <a:t>8/18/21</a:t>
             </a:fld>
             <a:endParaRPr lang="en-US"/>
           </a:p>
@@ -1029,7 +1034,7 @@
           <a:p>
             <a:fld id="{3D4FB17C-64C5-814C-8D68-9570E398B727}" type="datetimeFigureOut">
               <a:rPr lang="en-US" smtClean="0"/>
-              <a:t>8/15/21</a:t>
+              <a:t>8/18/21</a:t>
             </a:fld>
             <a:endParaRPr lang="en-US"/>
           </a:p>
@@ -1199,7 +1204,7 @@
           <a:p>
             <a:fld id="{3D4FB17C-64C5-814C-8D68-9570E398B727}" type="datetimeFigureOut">
               <a:rPr lang="en-US" smtClean="0"/>
-              <a:t>8/15/21</a:t>
+              <a:t>8/18/21</a:t>
             </a:fld>
             <a:endParaRPr lang="en-US"/>
           </a:p>
@@ -1443,7 +1448,7 @@
           <a:p>
             <a:fld id="{3D4FB17C-64C5-814C-8D68-9570E398B727}" type="datetimeFigureOut">
               <a:rPr lang="en-US" smtClean="0"/>
-              <a:t>8/15/21</a:t>
+              <a:t>8/18/21</a:t>
             </a:fld>
             <a:endParaRPr lang="en-US"/>
           </a:p>
@@ -1675,7 +1680,7 @@
           <a:p>
             <a:fld id="{3D4FB17C-64C5-814C-8D68-9570E398B727}" type="datetimeFigureOut">
               <a:rPr lang="en-US" smtClean="0"/>
-              <a:t>8/15/21</a:t>
+              <a:t>8/18/21</a:t>
             </a:fld>
             <a:endParaRPr lang="en-US"/>
           </a:p>
@@ -2042,7 +2047,7 @@
           <a:p>
             <a:fld id="{3D4FB17C-64C5-814C-8D68-9570E398B727}" type="datetimeFigureOut">
               <a:rPr lang="en-US" smtClean="0"/>
-              <a:t>8/15/21</a:t>
+              <a:t>8/18/21</a:t>
             </a:fld>
             <a:endParaRPr lang="en-US"/>
           </a:p>
@@ -2160,7 +2165,7 @@
           <a:p>
             <a:fld id="{3D4FB17C-64C5-814C-8D68-9570E398B727}" type="datetimeFigureOut">
               <a:rPr lang="en-US" smtClean="0"/>
-              <a:t>8/15/21</a:t>
+              <a:t>8/18/21</a:t>
             </a:fld>
             <a:endParaRPr lang="en-US"/>
           </a:p>
@@ -2255,7 +2260,7 @@
           <a:p>
             <a:fld id="{3D4FB17C-64C5-814C-8D68-9570E398B727}" type="datetimeFigureOut">
               <a:rPr lang="en-US" smtClean="0"/>
-              <a:t>8/15/21</a:t>
+              <a:t>8/18/21</a:t>
             </a:fld>
             <a:endParaRPr lang="en-US"/>
           </a:p>
@@ -2532,7 +2537,7 @@
           <a:p>
             <a:fld id="{3D4FB17C-64C5-814C-8D68-9570E398B727}" type="datetimeFigureOut">
               <a:rPr lang="en-US" smtClean="0"/>
-              <a:t>8/15/21</a:t>
+              <a:t>8/18/21</a:t>
             </a:fld>
             <a:endParaRPr lang="en-US"/>
           </a:p>
@@ -2789,7 +2794,7 @@
           <a:p>
             <a:fld id="{3D4FB17C-64C5-814C-8D68-9570E398B727}" type="datetimeFigureOut">
               <a:rPr lang="en-US" smtClean="0"/>
-              <a:t>8/15/21</a:t>
+              <a:t>8/18/21</a:t>
             </a:fld>
             <a:endParaRPr lang="en-US"/>
           </a:p>
@@ -3002,7 +3007,7 @@
           <a:p>
             <a:fld id="{3D4FB17C-64C5-814C-8D68-9570E398B727}" type="datetimeFigureOut">
               <a:rPr lang="en-US" smtClean="0"/>
-              <a:t>8/15/21</a:t>
+              <a:t>8/18/21</a:t>
             </a:fld>
             <a:endParaRPr lang="en-US"/>
           </a:p>
@@ -3409,10 +3414,10 @@
       </p:grpSpPr>
       <p:pic>
         <p:nvPicPr>
-          <p:cNvPr id="33" name="Picture 32">
+          <p:cNvPr id="5" name="Picture 4">
             <a:extLst>
               <a:ext uri="{FF2B5EF4-FFF2-40B4-BE49-F238E27FC236}">
-                <a16:creationId xmlns:a16="http://schemas.microsoft.com/office/drawing/2014/main" id="{05D0C280-1287-F042-800A-474476B31812}"/>
+                <a16:creationId xmlns:a16="http://schemas.microsoft.com/office/drawing/2014/main" id="{EA2D6D78-2C1B-0947-9A48-062B37018252}"/>
               </a:ext>
             </a:extLst>
           </p:cNvPr>
@@ -3423,13 +3428,13 @@
         </p:nvPicPr>
         <p:blipFill rotWithShape="1">
           <a:blip r:embed="rId3"/>
-          <a:srcRect t="77068"/>
+          <a:srcRect t="49000" b="24634"/>
           <a:stretch/>
         </p:blipFill>
         <p:spPr>
           <a:xfrm>
-            <a:off x="469348" y="8097079"/>
-            <a:ext cx="6197600" cy="515486"/>
+            <a:off x="424877" y="5742863"/>
+            <a:ext cx="6197600" cy="592668"/>
           </a:xfrm>
           <a:prstGeom prst="rect">
             <a:avLst/>
@@ -3438,10 +3443,10 @@
       </p:pic>
       <p:pic>
         <p:nvPicPr>
-          <p:cNvPr id="34" name="Picture 33">
+          <p:cNvPr id="20" name="Picture 19">
             <a:extLst>
               <a:ext uri="{FF2B5EF4-FFF2-40B4-BE49-F238E27FC236}">
-                <a16:creationId xmlns:a16="http://schemas.microsoft.com/office/drawing/2014/main" id="{CAD78075-1FD0-CE47-BCE9-60A6845D2EB9}"/>
+                <a16:creationId xmlns:a16="http://schemas.microsoft.com/office/drawing/2014/main" id="{3C9D6D90-F8ED-6949-BF5E-0B11DB40750B}"/>
               </a:ext>
             </a:extLst>
           </p:cNvPr>
@@ -3452,13 +3457,13 @@
         </p:nvPicPr>
         <p:blipFill rotWithShape="1">
           <a:blip r:embed="rId3"/>
-          <a:srcRect b="76874"/>
+          <a:srcRect t="76288"/>
           <a:stretch/>
         </p:blipFill>
         <p:spPr>
           <a:xfrm>
-            <a:off x="469348" y="1577887"/>
-            <a:ext cx="6197600" cy="519840"/>
+            <a:off x="424877" y="8140343"/>
+            <a:ext cx="6197600" cy="533031"/>
           </a:xfrm>
           <a:prstGeom prst="rect">
             <a:avLst/>
@@ -3467,39 +3472,10 @@
       </p:pic>
       <p:pic>
         <p:nvPicPr>
-          <p:cNvPr id="8" name="Picture 7">
+          <p:cNvPr id="19" name="Picture 18">
             <a:extLst>
               <a:ext uri="{FF2B5EF4-FFF2-40B4-BE49-F238E27FC236}">
-                <a16:creationId xmlns:a16="http://schemas.microsoft.com/office/drawing/2014/main" id="{32E2B5E6-55EC-034F-AD7F-D84B54C9140B}"/>
-              </a:ext>
-            </a:extLst>
-          </p:cNvPr>
-          <p:cNvPicPr>
-            <a:picLocks noChangeAspect="1"/>
-          </p:cNvPicPr>
-          <p:nvPr/>
-        </p:nvPicPr>
-        <p:blipFill rotWithShape="1">
-          <a:blip r:embed="rId4"/>
-          <a:srcRect r="18126" b="75555"/>
-          <a:stretch/>
-        </p:blipFill>
-        <p:spPr>
-          <a:xfrm>
-            <a:off x="0" y="0"/>
-            <a:ext cx="7162800" cy="1676400"/>
-          </a:xfrm>
-          <a:prstGeom prst="rect">
-            <a:avLst/>
-          </a:prstGeom>
-        </p:spPr>
-      </p:pic>
-      <p:pic>
-        <p:nvPicPr>
-          <p:cNvPr id="35" name="Picture 34">
-            <a:extLst>
-              <a:ext uri="{FF2B5EF4-FFF2-40B4-BE49-F238E27FC236}">
-                <a16:creationId xmlns:a16="http://schemas.microsoft.com/office/drawing/2014/main" id="{483B50F7-9394-544F-BB50-200BC3874276}"/>
+                <a16:creationId xmlns:a16="http://schemas.microsoft.com/office/drawing/2014/main" id="{BF4B4B86-969F-4644-B0E7-83CAAE7C8167}"/>
               </a:ext>
             </a:extLst>
           </p:cNvPr>
@@ -3510,13 +3486,13 @@
         </p:nvPicPr>
         <p:blipFill rotWithShape="1">
           <a:blip r:embed="rId3"/>
-          <a:srcRect t="22536" b="51525"/>
+          <a:srcRect t="24494" b="49894"/>
           <a:stretch/>
         </p:blipFill>
         <p:spPr>
           <a:xfrm>
-            <a:off x="469348" y="3620699"/>
-            <a:ext cx="6197600" cy="583095"/>
+            <a:off x="424877" y="3625525"/>
+            <a:ext cx="6197600" cy="575734"/>
           </a:xfrm>
           <a:prstGeom prst="rect">
             <a:avLst/>
@@ -3525,39 +3501,10 @@
       </p:pic>
       <p:pic>
         <p:nvPicPr>
-          <p:cNvPr id="9" name="Picture 8">
+          <p:cNvPr id="16" name="Picture 15">
             <a:extLst>
               <a:ext uri="{FF2B5EF4-FFF2-40B4-BE49-F238E27FC236}">
-                <a16:creationId xmlns:a16="http://schemas.microsoft.com/office/drawing/2014/main" id="{F095E90A-325F-FC45-9B88-F38B6A582635}"/>
-              </a:ext>
-            </a:extLst>
-          </p:cNvPr>
-          <p:cNvPicPr>
-            <a:picLocks noChangeAspect="1"/>
-          </p:cNvPicPr>
-          <p:nvPr/>
-        </p:nvPicPr>
-        <p:blipFill rotWithShape="1">
-          <a:blip r:embed="rId4"/>
-          <a:srcRect t="24058" r="17975" b="51594"/>
-          <a:stretch/>
-        </p:blipFill>
-        <p:spPr>
-          <a:xfrm>
-            <a:off x="0" y="2105958"/>
-            <a:ext cx="7176052" cy="1669774"/>
-          </a:xfrm>
-          <a:prstGeom prst="rect">
-            <a:avLst/>
-          </a:prstGeom>
-        </p:spPr>
-      </p:pic>
-      <p:pic>
-        <p:nvPicPr>
-          <p:cNvPr id="36" name="Picture 35">
-            <a:extLst>
-              <a:ext uri="{FF2B5EF4-FFF2-40B4-BE49-F238E27FC236}">
-                <a16:creationId xmlns:a16="http://schemas.microsoft.com/office/drawing/2014/main" id="{BCF585F1-8D27-F64D-9066-B2DA12BE763E}"/>
+                <a16:creationId xmlns:a16="http://schemas.microsoft.com/office/drawing/2014/main" id="{B9130602-4CFB-B54E-876A-6DB2E669B270}"/>
               </a:ext>
             </a:extLst>
           </p:cNvPr>
@@ -3568,71 +3515,13 @@
         </p:nvPicPr>
         <p:blipFill rotWithShape="1">
           <a:blip r:embed="rId3"/>
-          <a:srcRect t="50244" b="26174"/>
+          <a:srcRect b="76259"/>
           <a:stretch/>
         </p:blipFill>
         <p:spPr>
           <a:xfrm>
-            <a:off x="469348" y="5722353"/>
-            <a:ext cx="6197600" cy="530087"/>
-          </a:xfrm>
-          <a:prstGeom prst="rect">
-            <a:avLst/>
-          </a:prstGeom>
-        </p:spPr>
-      </p:pic>
-      <p:pic>
-        <p:nvPicPr>
-          <p:cNvPr id="10" name="Picture 9">
-            <a:extLst>
-              <a:ext uri="{FF2B5EF4-FFF2-40B4-BE49-F238E27FC236}">
-                <a16:creationId xmlns:a16="http://schemas.microsoft.com/office/drawing/2014/main" id="{C7A9C8DB-5CCB-B749-AB97-90D561FBE1AC}"/>
-              </a:ext>
-            </a:extLst>
-          </p:cNvPr>
-          <p:cNvPicPr>
-            <a:picLocks noChangeAspect="1"/>
-          </p:cNvPicPr>
-          <p:nvPr/>
-        </p:nvPicPr>
-        <p:blipFill rotWithShape="1">
-          <a:blip r:embed="rId4"/>
-          <a:srcRect t="48020" r="18126" b="27632"/>
-          <a:stretch/>
-        </p:blipFill>
-        <p:spPr>
-          <a:xfrm>
-            <a:off x="0" y="4175576"/>
-            <a:ext cx="7162800" cy="1669775"/>
-          </a:xfrm>
-          <a:prstGeom prst="rect">
-            <a:avLst/>
-          </a:prstGeom>
-        </p:spPr>
-      </p:pic>
-      <p:pic>
-        <p:nvPicPr>
-          <p:cNvPr id="7" name="Picture 6">
-            <a:extLst>
-              <a:ext uri="{FF2B5EF4-FFF2-40B4-BE49-F238E27FC236}">
-                <a16:creationId xmlns:a16="http://schemas.microsoft.com/office/drawing/2014/main" id="{7EB9E4A6-7253-E94D-ADCD-44336ACD6BD3}"/>
-              </a:ext>
-            </a:extLst>
-          </p:cNvPr>
-          <p:cNvPicPr>
-            <a:picLocks noChangeAspect="1"/>
-          </p:cNvPicPr>
-          <p:nvPr/>
-        </p:nvPicPr>
-        <p:blipFill rotWithShape="1">
-          <a:blip r:embed="rId4"/>
-          <a:srcRect t="71691" r="18429"/>
-          <a:stretch/>
-        </p:blipFill>
-        <p:spPr>
-          <a:xfrm>
-            <a:off x="0" y="6221902"/>
-            <a:ext cx="7136296" cy="1941443"/>
+            <a:off x="424877" y="1567510"/>
+            <a:ext cx="6197600" cy="533669"/>
           </a:xfrm>
           <a:prstGeom prst="rect">
             <a:avLst/>
@@ -3660,8 +3549,124 @@
         </p:blipFill>
         <p:spPr>
           <a:xfrm>
-            <a:off x="7038981" y="2940845"/>
+            <a:off x="7077074" y="1635993"/>
             <a:ext cx="1381126" cy="2663687"/>
+          </a:xfrm>
+          <a:prstGeom prst="rect">
+            <a:avLst/>
+          </a:prstGeom>
+        </p:spPr>
+      </p:pic>
+      <p:pic>
+        <p:nvPicPr>
+          <p:cNvPr id="14" name="Picture 13">
+            <a:extLst>
+              <a:ext uri="{FF2B5EF4-FFF2-40B4-BE49-F238E27FC236}">
+                <a16:creationId xmlns:a16="http://schemas.microsoft.com/office/drawing/2014/main" id="{2D615605-7982-8B49-A32A-9B495CD17400}"/>
+              </a:ext>
+            </a:extLst>
+          </p:cNvPr>
+          <p:cNvPicPr>
+            <a:picLocks noChangeAspect="1"/>
+          </p:cNvPicPr>
+          <p:nvPr/>
+        </p:nvPicPr>
+        <p:blipFill rotWithShape="1">
+          <a:blip r:embed="rId5"/>
+          <a:srcRect t="72361" r="18300"/>
+          <a:stretch/>
+        </p:blipFill>
+        <p:spPr>
+          <a:xfrm>
+            <a:off x="-29720" y="6324499"/>
+            <a:ext cx="7180111" cy="1904108"/>
+          </a:xfrm>
+          <a:prstGeom prst="rect">
+            <a:avLst/>
+          </a:prstGeom>
+        </p:spPr>
+      </p:pic>
+      <p:pic>
+        <p:nvPicPr>
+          <p:cNvPr id="15" name="Picture 14">
+            <a:extLst>
+              <a:ext uri="{FF2B5EF4-FFF2-40B4-BE49-F238E27FC236}">
+                <a16:creationId xmlns:a16="http://schemas.microsoft.com/office/drawing/2014/main" id="{68635B90-F672-8B45-A5AB-BEAD28F6D60D}"/>
+              </a:ext>
+            </a:extLst>
+          </p:cNvPr>
+          <p:cNvPicPr>
+            <a:picLocks noChangeAspect="1"/>
+          </p:cNvPicPr>
+          <p:nvPr/>
+        </p:nvPicPr>
+        <p:blipFill rotWithShape="1">
+          <a:blip r:embed="rId5"/>
+          <a:srcRect r="19568" b="75829"/>
+          <a:stretch/>
+        </p:blipFill>
+        <p:spPr>
+          <a:xfrm>
+            <a:off x="-29720" y="41411"/>
+            <a:ext cx="7068701" cy="1665230"/>
+          </a:xfrm>
+          <a:prstGeom prst="rect">
+            <a:avLst/>
+          </a:prstGeom>
+        </p:spPr>
+      </p:pic>
+      <p:pic>
+        <p:nvPicPr>
+          <p:cNvPr id="17" name="Picture 16">
+            <a:extLst>
+              <a:ext uri="{FF2B5EF4-FFF2-40B4-BE49-F238E27FC236}">
+                <a16:creationId xmlns:a16="http://schemas.microsoft.com/office/drawing/2014/main" id="{42C284A5-F86B-7B47-970C-5E3F57FB5B02}"/>
+              </a:ext>
+            </a:extLst>
+          </p:cNvPr>
+          <p:cNvPicPr>
+            <a:picLocks noChangeAspect="1"/>
+          </p:cNvPicPr>
+          <p:nvPr/>
+        </p:nvPicPr>
+        <p:blipFill rotWithShape="1">
+          <a:blip r:embed="rId5"/>
+          <a:srcRect t="23677" r="18169" b="51245"/>
+          <a:stretch/>
+        </p:blipFill>
+        <p:spPr>
+          <a:xfrm>
+            <a:off x="-27680" y="2058090"/>
+            <a:ext cx="7191656" cy="1727686"/>
+          </a:xfrm>
+          <a:prstGeom prst="rect">
+            <a:avLst/>
+          </a:prstGeom>
+        </p:spPr>
+      </p:pic>
+      <p:pic>
+        <p:nvPicPr>
+          <p:cNvPr id="18" name="Picture 17">
+            <a:extLst>
+              <a:ext uri="{FF2B5EF4-FFF2-40B4-BE49-F238E27FC236}">
+                <a16:creationId xmlns:a16="http://schemas.microsoft.com/office/drawing/2014/main" id="{BD67E26C-4598-0C4D-8E8B-1AF4987DA66B}"/>
+              </a:ext>
+            </a:extLst>
+          </p:cNvPr>
+          <p:cNvPicPr>
+            <a:picLocks noChangeAspect="1"/>
+          </p:cNvPicPr>
+          <p:nvPr/>
+        </p:nvPicPr>
+        <p:blipFill rotWithShape="1">
+          <a:blip r:embed="rId5"/>
+          <a:srcRect t="48122" r="18329" b="27545"/>
+          <a:stretch/>
+        </p:blipFill>
+        <p:spPr>
+          <a:xfrm>
+            <a:off x="-29720" y="4237198"/>
+            <a:ext cx="7177547" cy="1676400"/>
           </a:xfrm>
           <a:prstGeom prst="rect">
             <a:avLst/>

</xml_diff>